<commit_message>
Update with the slides 22/12/2023
</commit_message>
<xml_diff>
--- a/slides/slides_22122023.pptx
+++ b/slides/slides_22122023.pptx
@@ -20602,7 +20602,19 @@
           <a:p>
             <a:r>
               <a:rPr lang="fr-FR" dirty="0"/>
-              <a:t>Project</a:t>
+              <a:t>Project: </a:t>
+            </a:r>
+            <a:r>
+              <a:rPr lang="fr-FR" dirty="0" err="1"/>
+              <a:t>some</a:t>
+            </a:r>
+            <a:r>
+              <a:rPr lang="fr-FR" dirty="0"/>
+              <a:t> </a:t>
+            </a:r>
+            <a:r>
+              <a:rPr lang="fr-FR"/>
+              <a:t>details</a:t>
             </a:r>
             <a:endParaRPr lang="en-US" dirty="0"/>
           </a:p>
@@ -20652,6 +20664,15 @@
             <a:r>
               <a:rPr lang="fr-FR" dirty="0"/>
               <a:t> and July</a:t>
+            </a:r>
+          </a:p>
+          <a:p>
+            <a:endParaRPr lang="fr-FR" dirty="0"/>
+          </a:p>
+          <a:p>
+            <a:r>
+              <a:rPr lang="fr-FR" dirty="0"/>
+              <a:t>Installation date: Oct-2017</a:t>
             </a:r>
             <a:endParaRPr lang="en-US" dirty="0"/>
           </a:p>
@@ -22559,26 +22580,6 @@
 </file>
 
 <file path=customXml/item1.xml><?xml version="1.0" encoding="utf-8"?>
-<?mso-contentType ?>
-<FormTemplates xmlns="http://schemas.microsoft.com/sharepoint/v3/contenttype/forms">
-  <Display>DocumentLibraryForm</Display>
-  <Edit>DocumentLibraryForm</Edit>
-  <New>DocumentLibraryForm</New>
-</FormTemplates>
-</file>
-
-<file path=customXml/item2.xml><?xml version="1.0" encoding="utf-8"?>
-<p:properties xmlns:p="http://schemas.microsoft.com/office/2006/metadata/properties" xmlns:xsi="http://www.w3.org/2001/XMLSchema-instance" xmlns:pc="http://schemas.microsoft.com/office/infopath/2007/PartnerControls">
-  <documentManagement>
-    <lcf76f155ced4ddcb4097134ff3c332f xmlns="4c2def87-6459-45fe-82b8-2c44ad774fe7">
-      <Terms xmlns="http://schemas.microsoft.com/office/infopath/2007/PartnerControls"/>
-    </lcf76f155ced4ddcb4097134ff3c332f>
-    <TaxCatchAll xmlns="284c3d22-818e-4cb3-91ed-c315e7cac822" xsi:nil="true"/>
-  </documentManagement>
-</p:properties>
-</file>
-
-<file path=customXml/item3.xml><?xml version="1.0" encoding="utf-8"?>
 <ct:contentTypeSchema xmlns:ct="http://schemas.microsoft.com/office/2006/metadata/contentType" xmlns:ma="http://schemas.microsoft.com/office/2006/metadata/properties/metaAttributes" ct:_="" ma:_="" ma:contentTypeName="Document" ma:contentTypeID="0x01010041F95B9FA815364FBC35CFCC50A6DF2E" ma:contentTypeVersion="14" ma:contentTypeDescription="Create a new document." ma:contentTypeScope="" ma:versionID="79a45fa4d5681b63d051de39515cb8e3">
   <xsd:schema xmlns:xsd="http://www.w3.org/2001/XMLSchema" xmlns:xs="http://www.w3.org/2001/XMLSchema" xmlns:p="http://schemas.microsoft.com/office/2006/metadata/properties" xmlns:ns2="4c2def87-6459-45fe-82b8-2c44ad774fe7" xmlns:ns3="284c3d22-818e-4cb3-91ed-c315e7cac822" targetNamespace="http://schemas.microsoft.com/office/2006/metadata/properties" ma:root="true" ma:fieldsID="8d96ec500039b56ee849b1547a40a351" ns2:_="" ns3:_="">
     <xsd:import namespace="4c2def87-6459-45fe-82b8-2c44ad774fe7"/>
@@ -22807,32 +22808,27 @@
 </ct:contentTypeSchema>
 </file>
 
-<file path=customXml/itemProps1.xml><?xml version="1.0" encoding="utf-8"?>
-<ds:datastoreItem xmlns:ds="http://schemas.openxmlformats.org/officeDocument/2006/customXml" ds:itemID="{2664B94C-923D-4FDF-A77E-CE30A0087E87}">
-  <ds:schemaRefs>
-    <ds:schemaRef ds:uri="http://schemas.microsoft.com/sharepoint/v3/contenttype/forms"/>
-  </ds:schemaRefs>
-</ds:datastoreItem>
+<file path=customXml/item2.xml><?xml version="1.0" encoding="utf-8"?>
+<p:properties xmlns:p="http://schemas.microsoft.com/office/2006/metadata/properties" xmlns:xsi="http://www.w3.org/2001/XMLSchema-instance" xmlns:pc="http://schemas.microsoft.com/office/infopath/2007/PartnerControls">
+  <documentManagement>
+    <lcf76f155ced4ddcb4097134ff3c332f xmlns="4c2def87-6459-45fe-82b8-2c44ad774fe7">
+      <Terms xmlns="http://schemas.microsoft.com/office/infopath/2007/PartnerControls"/>
+    </lcf76f155ced4ddcb4097134ff3c332f>
+    <TaxCatchAll xmlns="284c3d22-818e-4cb3-91ed-c315e7cac822" xsi:nil="true"/>
+  </documentManagement>
+</p:properties>
 </file>
 
-<file path=customXml/itemProps2.xml><?xml version="1.0" encoding="utf-8"?>
-<ds:datastoreItem xmlns:ds="http://schemas.openxmlformats.org/officeDocument/2006/customXml" ds:itemID="{ACD7CA8D-F7E9-4DB4-9EFF-5F098173D501}">
-  <ds:schemaRefs>
-    <ds:schemaRef ds:uri="http://schemas.microsoft.com/office/2006/metadata/properties"/>
-    <ds:schemaRef ds:uri="http://purl.org/dc/terms/"/>
-    <ds:schemaRef ds:uri="http://purl.org/dc/dcmitype/"/>
-    <ds:schemaRef ds:uri="http://schemas.openxmlformats.org/package/2006/metadata/core-properties"/>
-    <ds:schemaRef ds:uri="4c2def87-6459-45fe-82b8-2c44ad774fe7"/>
-    <ds:schemaRef ds:uri="http://purl.org/dc/elements/1.1/"/>
-    <ds:schemaRef ds:uri="http://schemas.microsoft.com/office/2006/documentManagement/types"/>
-    <ds:schemaRef ds:uri="http://schemas.microsoft.com/office/infopath/2007/PartnerControls"/>
-    <ds:schemaRef ds:uri="284c3d22-818e-4cb3-91ed-c315e7cac822"/>
-    <ds:schemaRef ds:uri="http://www.w3.org/XML/1998/namespace"/>
-  </ds:schemaRefs>
-</ds:datastoreItem>
+<file path=customXml/item3.xml><?xml version="1.0" encoding="utf-8"?>
+<?mso-contentType ?>
+<FormTemplates xmlns="http://schemas.microsoft.com/sharepoint/v3/contenttype/forms">
+  <Display>DocumentLibraryForm</Display>
+  <Edit>DocumentLibraryForm</Edit>
+  <New>DocumentLibraryForm</New>
+</FormTemplates>
 </file>
 
-<file path=customXml/itemProps3.xml><?xml version="1.0" encoding="utf-8"?>
+<file path=customXml/itemProps1.xml><?xml version="1.0" encoding="utf-8"?>
 <ds:datastoreItem xmlns:ds="http://schemas.openxmlformats.org/officeDocument/2006/customXml" ds:itemID="{D0A8C6C5-AEB9-4E3A-BA66-1F590519ED94}">
   <ds:schemaRefs>
     <ds:schemaRef ds:uri="http://schemas.microsoft.com/office/2006/metadata/contentType"/>
@@ -22849,4 +22845,29 @@
     <ds:schemaRef ds:uri="http://schemas.microsoft.com/internal/obd"/>
   </ds:schemaRefs>
 </ds:datastoreItem>
+</file>
+
+<file path=customXml/itemProps2.xml><?xml version="1.0" encoding="utf-8"?>
+<ds:datastoreItem xmlns:ds="http://schemas.openxmlformats.org/officeDocument/2006/customXml" ds:itemID="{ACD7CA8D-F7E9-4DB4-9EFF-5F098173D501}">
+  <ds:schemaRefs>
+    <ds:schemaRef ds:uri="http://purl.org/dc/elements/1.1/"/>
+    <ds:schemaRef ds:uri="http://schemas.microsoft.com/office/2006/documentManagement/types"/>
+    <ds:schemaRef ds:uri="284c3d22-818e-4cb3-91ed-c315e7cac822"/>
+    <ds:schemaRef ds:uri="http://schemas.openxmlformats.org/package/2006/metadata/core-properties"/>
+    <ds:schemaRef ds:uri="http://purl.org/dc/terms/"/>
+    <ds:schemaRef ds:uri="http://schemas.microsoft.com/office/infopath/2007/PartnerControls"/>
+    <ds:schemaRef ds:uri="http://purl.org/dc/dcmitype/"/>
+    <ds:schemaRef ds:uri="http://schemas.microsoft.com/office/2006/metadata/properties"/>
+    <ds:schemaRef ds:uri="4c2def87-6459-45fe-82b8-2c44ad774fe7"/>
+    <ds:schemaRef ds:uri="http://www.w3.org/XML/1998/namespace"/>
+  </ds:schemaRefs>
+</ds:datastoreItem>
+</file>
+
+<file path=customXml/itemProps3.xml><?xml version="1.0" encoding="utf-8"?>
+<ds:datastoreItem xmlns:ds="http://schemas.openxmlformats.org/officeDocument/2006/customXml" ds:itemID="{2664B94C-923D-4FDF-A77E-CE30A0087E87}">
+  <ds:schemaRefs>
+    <ds:schemaRef ds:uri="http://schemas.microsoft.com/sharepoint/v3/contenttype/forms"/>
+  </ds:schemaRefs>
+</ds:datastoreItem>
 </file>
</xml_diff>

<commit_message>
Typo with the slides 22/12/2023
</commit_message>
<xml_diff>
--- a/slides/slides_22122023.pptx
+++ b/slides/slides_22122023.pptx
@@ -21625,7 +21625,15 @@
             </a:r>
             <a:r>
               <a:rPr lang="fr-FR" dirty="0"/>
-              <a:t> the 5 csv files + </a:t>
+              <a:t> </a:t>
+            </a:r>
+            <a:r>
+              <a:rPr lang="fr-FR"/>
+              <a:t>the 4 </a:t>
+            </a:r>
+            <a:r>
+              <a:rPr lang="fr-FR" dirty="0"/>
+              <a:t>csv files + </a:t>
             </a:r>
             <a:r>
               <a:rPr lang="fr-FR" dirty="0" err="1"/>
@@ -22750,26 +22758,6 @@
 </file>
 
 <file path=customXml/item1.xml><?xml version="1.0" encoding="utf-8"?>
-<?mso-contentType ?>
-<FormTemplates xmlns="http://schemas.microsoft.com/sharepoint/v3/contenttype/forms">
-  <Display>DocumentLibraryForm</Display>
-  <Edit>DocumentLibraryForm</Edit>
-  <New>DocumentLibraryForm</New>
-</FormTemplates>
-</file>
-
-<file path=customXml/item2.xml><?xml version="1.0" encoding="utf-8"?>
-<p:properties xmlns:p="http://schemas.microsoft.com/office/2006/metadata/properties" xmlns:xsi="http://www.w3.org/2001/XMLSchema-instance" xmlns:pc="http://schemas.microsoft.com/office/infopath/2007/PartnerControls">
-  <documentManagement>
-    <lcf76f155ced4ddcb4097134ff3c332f xmlns="4c2def87-6459-45fe-82b8-2c44ad774fe7">
-      <Terms xmlns="http://schemas.microsoft.com/office/infopath/2007/PartnerControls"/>
-    </lcf76f155ced4ddcb4097134ff3c332f>
-    <TaxCatchAll xmlns="284c3d22-818e-4cb3-91ed-c315e7cac822" xsi:nil="true"/>
-  </documentManagement>
-</p:properties>
-</file>
-
-<file path=customXml/item3.xml><?xml version="1.0" encoding="utf-8"?>
 <ct:contentTypeSchema xmlns:ct="http://schemas.microsoft.com/office/2006/metadata/contentType" xmlns:ma="http://schemas.microsoft.com/office/2006/metadata/properties/metaAttributes" ct:_="" ma:_="" ma:contentTypeName="Document" ma:contentTypeID="0x01010041F95B9FA815364FBC35CFCC50A6DF2E" ma:contentTypeVersion="14" ma:contentTypeDescription="Create a new document." ma:contentTypeScope="" ma:versionID="79a45fa4d5681b63d051de39515cb8e3">
   <xsd:schema xmlns:xsd="http://www.w3.org/2001/XMLSchema" xmlns:xs="http://www.w3.org/2001/XMLSchema" xmlns:p="http://schemas.microsoft.com/office/2006/metadata/properties" xmlns:ns2="4c2def87-6459-45fe-82b8-2c44ad774fe7" xmlns:ns3="284c3d22-818e-4cb3-91ed-c315e7cac822" targetNamespace="http://schemas.microsoft.com/office/2006/metadata/properties" ma:root="true" ma:fieldsID="8d96ec500039b56ee849b1547a40a351" ns2:_="" ns3:_="">
     <xsd:import namespace="4c2def87-6459-45fe-82b8-2c44ad774fe7"/>
@@ -22998,10 +22986,41 @@
 </ct:contentTypeSchema>
 </file>
 
+<file path=customXml/item2.xml><?xml version="1.0" encoding="utf-8"?>
+<p:properties xmlns:p="http://schemas.microsoft.com/office/2006/metadata/properties" xmlns:xsi="http://www.w3.org/2001/XMLSchema-instance" xmlns:pc="http://schemas.microsoft.com/office/infopath/2007/PartnerControls">
+  <documentManagement>
+    <lcf76f155ced4ddcb4097134ff3c332f xmlns="4c2def87-6459-45fe-82b8-2c44ad774fe7">
+      <Terms xmlns="http://schemas.microsoft.com/office/infopath/2007/PartnerControls"/>
+    </lcf76f155ced4ddcb4097134ff3c332f>
+    <TaxCatchAll xmlns="284c3d22-818e-4cb3-91ed-c315e7cac822" xsi:nil="true"/>
+  </documentManagement>
+</p:properties>
+</file>
+
+<file path=customXml/item3.xml><?xml version="1.0" encoding="utf-8"?>
+<?mso-contentType ?>
+<FormTemplates xmlns="http://schemas.microsoft.com/sharepoint/v3/contenttype/forms">
+  <Display>DocumentLibraryForm</Display>
+  <Edit>DocumentLibraryForm</Edit>
+  <New>DocumentLibraryForm</New>
+</FormTemplates>
+</file>
+
 <file path=customXml/itemProps1.xml><?xml version="1.0" encoding="utf-8"?>
-<ds:datastoreItem xmlns:ds="http://schemas.openxmlformats.org/officeDocument/2006/customXml" ds:itemID="{2664B94C-923D-4FDF-A77E-CE30A0087E87}">
+<ds:datastoreItem xmlns:ds="http://schemas.openxmlformats.org/officeDocument/2006/customXml" ds:itemID="{D0A8C6C5-AEB9-4E3A-BA66-1F590519ED94}">
   <ds:schemaRefs>
-    <ds:schemaRef ds:uri="http://schemas.microsoft.com/sharepoint/v3/contenttype/forms"/>
+    <ds:schemaRef ds:uri="http://schemas.microsoft.com/office/2006/metadata/contentType"/>
+    <ds:schemaRef ds:uri="http://schemas.microsoft.com/office/2006/metadata/properties/metaAttributes"/>
+    <ds:schemaRef ds:uri="http://www.w3.org/2001/XMLSchema"/>
+    <ds:schemaRef ds:uri="http://schemas.microsoft.com/office/2006/metadata/properties"/>
+    <ds:schemaRef ds:uri="4c2def87-6459-45fe-82b8-2c44ad774fe7"/>
+    <ds:schemaRef ds:uri="284c3d22-818e-4cb3-91ed-c315e7cac822"/>
+    <ds:schemaRef ds:uri="http://schemas.microsoft.com/office/2006/documentManagement/types"/>
+    <ds:schemaRef ds:uri="http://schemas.microsoft.com/office/infopath/2007/PartnerControls"/>
+    <ds:schemaRef ds:uri="http://schemas.openxmlformats.org/package/2006/metadata/core-properties"/>
+    <ds:schemaRef ds:uri="http://purl.org/dc/elements/1.1/"/>
+    <ds:schemaRef ds:uri="http://purl.org/dc/terms/"/>
+    <ds:schemaRef ds:uri="http://schemas.microsoft.com/internal/obd"/>
   </ds:schemaRefs>
 </ds:datastoreItem>
 </file>
@@ -23024,20 +23043,9 @@
 </file>
 
 <file path=customXml/itemProps3.xml><?xml version="1.0" encoding="utf-8"?>
-<ds:datastoreItem xmlns:ds="http://schemas.openxmlformats.org/officeDocument/2006/customXml" ds:itemID="{D0A8C6C5-AEB9-4E3A-BA66-1F590519ED94}">
+<ds:datastoreItem xmlns:ds="http://schemas.openxmlformats.org/officeDocument/2006/customXml" ds:itemID="{2664B94C-923D-4FDF-A77E-CE30A0087E87}">
   <ds:schemaRefs>
-    <ds:schemaRef ds:uri="http://schemas.microsoft.com/office/2006/metadata/contentType"/>
-    <ds:schemaRef ds:uri="http://schemas.microsoft.com/office/2006/metadata/properties/metaAttributes"/>
-    <ds:schemaRef ds:uri="http://www.w3.org/2001/XMLSchema"/>
-    <ds:schemaRef ds:uri="http://schemas.microsoft.com/office/2006/metadata/properties"/>
-    <ds:schemaRef ds:uri="4c2def87-6459-45fe-82b8-2c44ad774fe7"/>
-    <ds:schemaRef ds:uri="284c3d22-818e-4cb3-91ed-c315e7cac822"/>
-    <ds:schemaRef ds:uri="http://schemas.microsoft.com/office/2006/documentManagement/types"/>
-    <ds:schemaRef ds:uri="http://schemas.microsoft.com/office/infopath/2007/PartnerControls"/>
-    <ds:schemaRef ds:uri="http://schemas.openxmlformats.org/package/2006/metadata/core-properties"/>
-    <ds:schemaRef ds:uri="http://purl.org/dc/elements/1.1/"/>
-    <ds:schemaRef ds:uri="http://purl.org/dc/terms/"/>
-    <ds:schemaRef ds:uri="http://schemas.microsoft.com/internal/obd"/>
+    <ds:schemaRef ds:uri="http://schemas.microsoft.com/sharepoint/v3/contenttype/forms"/>
   </ds:schemaRefs>
 </ds:datastoreItem>
 </file>
</xml_diff>